<commit_message>
images updated, pubsub replaced with api
</commit_message>
<xml_diff>
--- a/docs/kafka.pptx
+++ b/docs/kafka.pptx
@@ -259,7 +259,7 @@
           <a:p>
             <a:fld id="{6B03BB80-EA23-4DC4-8F82-1E8F723ACCC2}" type="datetimeFigureOut">
               <a:rPr lang="en-US" smtClean="0"/>
-              <a:t>6/9/2021</a:t>
+              <a:t>6/12/2021</a:t>
             </a:fld>
             <a:endParaRPr lang="en-US"/>
           </a:p>
@@ -429,7 +429,7 @@
           <a:p>
             <a:fld id="{6B03BB80-EA23-4DC4-8F82-1E8F723ACCC2}" type="datetimeFigureOut">
               <a:rPr lang="en-US" smtClean="0"/>
-              <a:t>6/9/2021</a:t>
+              <a:t>6/12/2021</a:t>
             </a:fld>
             <a:endParaRPr lang="en-US"/>
           </a:p>
@@ -609,7 +609,7 @@
           <a:p>
             <a:fld id="{6B03BB80-EA23-4DC4-8F82-1E8F723ACCC2}" type="datetimeFigureOut">
               <a:rPr lang="en-US" smtClean="0"/>
-              <a:t>6/9/2021</a:t>
+              <a:t>6/12/2021</a:t>
             </a:fld>
             <a:endParaRPr lang="en-US"/>
           </a:p>
@@ -779,7 +779,7 @@
           <a:p>
             <a:fld id="{6B03BB80-EA23-4DC4-8F82-1E8F723ACCC2}" type="datetimeFigureOut">
               <a:rPr lang="en-US" smtClean="0"/>
-              <a:t>6/9/2021</a:t>
+              <a:t>6/12/2021</a:t>
             </a:fld>
             <a:endParaRPr lang="en-US"/>
           </a:p>
@@ -1025,7 +1025,7 @@
           <a:p>
             <a:fld id="{6B03BB80-EA23-4DC4-8F82-1E8F723ACCC2}" type="datetimeFigureOut">
               <a:rPr lang="en-US" smtClean="0"/>
-              <a:t>6/9/2021</a:t>
+              <a:t>6/12/2021</a:t>
             </a:fld>
             <a:endParaRPr lang="en-US"/>
           </a:p>
@@ -1257,7 +1257,7 @@
           <a:p>
             <a:fld id="{6B03BB80-EA23-4DC4-8F82-1E8F723ACCC2}" type="datetimeFigureOut">
               <a:rPr lang="en-US" smtClean="0"/>
-              <a:t>6/9/2021</a:t>
+              <a:t>6/12/2021</a:t>
             </a:fld>
             <a:endParaRPr lang="en-US"/>
           </a:p>
@@ -1624,7 +1624,7 @@
           <a:p>
             <a:fld id="{6B03BB80-EA23-4DC4-8F82-1E8F723ACCC2}" type="datetimeFigureOut">
               <a:rPr lang="en-US" smtClean="0"/>
-              <a:t>6/9/2021</a:t>
+              <a:t>6/12/2021</a:t>
             </a:fld>
             <a:endParaRPr lang="en-US"/>
           </a:p>
@@ -1742,7 +1742,7 @@
           <a:p>
             <a:fld id="{6B03BB80-EA23-4DC4-8F82-1E8F723ACCC2}" type="datetimeFigureOut">
               <a:rPr lang="en-US" smtClean="0"/>
-              <a:t>6/9/2021</a:t>
+              <a:t>6/12/2021</a:t>
             </a:fld>
             <a:endParaRPr lang="en-US"/>
           </a:p>
@@ -1837,7 +1837,7 @@
           <a:p>
             <a:fld id="{6B03BB80-EA23-4DC4-8F82-1E8F723ACCC2}" type="datetimeFigureOut">
               <a:rPr lang="en-US" smtClean="0"/>
-              <a:t>6/9/2021</a:t>
+              <a:t>6/12/2021</a:t>
             </a:fld>
             <a:endParaRPr lang="en-US"/>
           </a:p>
@@ -2114,7 +2114,7 @@
           <a:p>
             <a:fld id="{6B03BB80-EA23-4DC4-8F82-1E8F723ACCC2}" type="datetimeFigureOut">
               <a:rPr lang="en-US" smtClean="0"/>
-              <a:t>6/9/2021</a:t>
+              <a:t>6/12/2021</a:t>
             </a:fld>
             <a:endParaRPr lang="en-US"/>
           </a:p>
@@ -2367,7 +2367,7 @@
           <a:p>
             <a:fld id="{6B03BB80-EA23-4DC4-8F82-1E8F723ACCC2}" type="datetimeFigureOut">
               <a:rPr lang="en-US" smtClean="0"/>
-              <a:t>6/9/2021</a:t>
+              <a:t>6/12/2021</a:t>
             </a:fld>
             <a:endParaRPr lang="en-US"/>
           </a:p>
@@ -2580,7 +2580,7 @@
           <a:p>
             <a:fld id="{6B03BB80-EA23-4DC4-8F82-1E8F723ACCC2}" type="datetimeFigureOut">
               <a:rPr lang="en-US" smtClean="0"/>
-              <a:t>6/9/2021</a:t>
+              <a:t>6/12/2021</a:t>
             </a:fld>
             <a:endParaRPr lang="en-US"/>
           </a:p>
@@ -29048,8 +29048,9 @@
             </a:avLst>
           </a:prstGeom>
           <a:solidFill>
-            <a:schemeClr val="accent4">
-              <a:lumMod val="75000"/>
+            <a:schemeClr val="tx2">
+              <a:lumMod val="60000"/>
+              <a:lumOff val="40000"/>
             </a:schemeClr>
           </a:solidFill>
           <a:ln w="12700">
@@ -29091,7 +29092,7 @@
           </a:fontRef>
         </p:style>
         <p:txBody>
-          <a:bodyPr rtlCol="0" anchor="ctr"/>
+          <a:bodyPr rtlCol="0" anchor="b" anchorCtr="0"/>
           <a:lstStyle/>
           <a:p>
             <a:pPr algn="ctr"/>
@@ -29130,8 +29131,9 @@
             </a:avLst>
           </a:prstGeom>
           <a:solidFill>
-            <a:schemeClr val="accent4">
-              <a:lumMod val="75000"/>
+            <a:schemeClr val="tx2">
+              <a:lumMod val="60000"/>
+              <a:lumOff val="40000"/>
             </a:schemeClr>
           </a:solidFill>
           <a:ln w="12700">
@@ -29173,7 +29175,7 @@
           </a:fontRef>
         </p:style>
         <p:txBody>
-          <a:bodyPr rtlCol="0" anchor="ctr"/>
+          <a:bodyPr rtlCol="0" anchor="b" anchorCtr="0"/>
           <a:lstStyle/>
           <a:p>
             <a:pPr algn="ctr"/>
@@ -29212,8 +29214,9 @@
             </a:avLst>
           </a:prstGeom>
           <a:solidFill>
-            <a:schemeClr val="accent4">
-              <a:lumMod val="75000"/>
+            <a:schemeClr val="tx2">
+              <a:lumMod val="60000"/>
+              <a:lumOff val="40000"/>
             </a:schemeClr>
           </a:solidFill>
           <a:ln w="12700">
@@ -29255,7 +29258,7 @@
           </a:fontRef>
         </p:style>
         <p:txBody>
-          <a:bodyPr rtlCol="0" anchor="ctr"/>
+          <a:bodyPr rtlCol="0" anchor="b" anchorCtr="0"/>
           <a:lstStyle/>
           <a:p>
             <a:pPr algn="ctr"/>
@@ -29294,8 +29297,9 @@
             </a:avLst>
           </a:prstGeom>
           <a:solidFill>
-            <a:schemeClr val="accent4">
-              <a:lumMod val="75000"/>
+            <a:schemeClr val="tx2">
+              <a:lumMod val="60000"/>
+              <a:lumOff val="40000"/>
             </a:schemeClr>
           </a:solidFill>
           <a:ln w="12700">
@@ -29337,7 +29341,7 @@
           </a:fontRef>
         </p:style>
         <p:txBody>
-          <a:bodyPr rtlCol="0" anchor="ctr"/>
+          <a:bodyPr rtlCol="0" anchor="b" anchorCtr="0"/>
           <a:lstStyle/>
           <a:p>
             <a:pPr algn="ctr"/>
@@ -30583,7 +30587,7 @@
         <p:spPr>
           <a:xfrm>
             <a:off x="8844597" y="2022934"/>
-            <a:ext cx="1044325" cy="307777"/>
+            <a:ext cx="1129284" cy="307777"/>
           </a:xfrm>
           <a:prstGeom prst="rect">
             <a:avLst/>
@@ -30609,7 +30613,18 @@
                 </a:solidFill>
                 <a:latin typeface="+mj-lt"/>
               </a:rPr>
-              <a:t>data stream</a:t>
+              <a:t>event </a:t>
+            </a:r>
+            <a:r>
+              <a:rPr lang="de-DE" sz="1400" noProof="1" smtClean="0">
+                <a:solidFill>
+                  <a:schemeClr val="accent4">
+                    <a:lumMod val="75000"/>
+                  </a:schemeClr>
+                </a:solidFill>
+                <a:latin typeface="+mj-lt"/>
+              </a:rPr>
+              <a:t>stream</a:t>
             </a:r>
           </a:p>
         </p:txBody>
@@ -31970,6 +31985,738 @@
           </a:fontRef>
         </p:style>
       </p:cxnSp>
+      <p:sp>
+        <p:nvSpPr>
+          <p:cNvPr id="83" name="Abgerundetes Rechteck 82"/>
+          <p:cNvSpPr>
+            <a:spLocks noChangeAspect="1"/>
+          </p:cNvSpPr>
+          <p:nvPr/>
+        </p:nvSpPr>
+        <p:spPr>
+          <a:xfrm>
+            <a:off x="4779175" y="1048363"/>
+            <a:ext cx="176566" cy="176566"/>
+          </a:xfrm>
+          <a:prstGeom prst="roundRect">
+            <a:avLst/>
+          </a:prstGeom>
+          <a:solidFill>
+            <a:schemeClr val="accent4">
+              <a:lumMod val="60000"/>
+              <a:lumOff val="40000"/>
+            </a:schemeClr>
+          </a:solidFill>
+          <a:ln w="3175">
+            <a:noFill/>
+            <a:prstDash val="sysDot"/>
+          </a:ln>
+          <a:effectLst/>
+          <a:scene3d>
+            <a:camera prst="isometricTopUp"/>
+            <a:lightRig rig="threePt" dir="t"/>
+          </a:scene3d>
+        </p:spPr>
+        <p:style>
+          <a:lnRef idx="2">
+            <a:schemeClr val="accent1">
+              <a:shade val="50000"/>
+            </a:schemeClr>
+          </a:lnRef>
+          <a:fillRef idx="1">
+            <a:schemeClr val="accent1"/>
+          </a:fillRef>
+          <a:effectRef idx="0">
+            <a:schemeClr val="accent1"/>
+          </a:effectRef>
+          <a:fontRef idx="minor">
+            <a:schemeClr val="lt1"/>
+          </a:fontRef>
+        </p:style>
+        <p:txBody>
+          <a:bodyPr rtlCol="0" anchor="ctr" anchorCtr="0"/>
+          <a:lstStyle/>
+          <a:p>
+            <a:endParaRPr lang="en-US" sz="1200" i="1" noProof="1">
+              <a:solidFill>
+                <a:schemeClr val="bg1"/>
+              </a:solidFill>
+              <a:latin typeface="+mj-lt"/>
+            </a:endParaRPr>
+          </a:p>
+        </p:txBody>
+      </p:sp>
+      <p:sp>
+        <p:nvSpPr>
+          <p:cNvPr id="87" name="Abgerundetes Rechteck 86"/>
+          <p:cNvSpPr>
+            <a:spLocks noChangeAspect="1"/>
+          </p:cNvSpPr>
+          <p:nvPr/>
+        </p:nvSpPr>
+        <p:spPr>
+          <a:xfrm>
+            <a:off x="4977298" y="1161840"/>
+            <a:ext cx="176566" cy="176566"/>
+          </a:xfrm>
+          <a:prstGeom prst="roundRect">
+            <a:avLst/>
+          </a:prstGeom>
+          <a:solidFill>
+            <a:schemeClr val="accent4">
+              <a:lumMod val="60000"/>
+              <a:lumOff val="40000"/>
+            </a:schemeClr>
+          </a:solidFill>
+          <a:ln w="3175">
+            <a:noFill/>
+            <a:prstDash val="sysDot"/>
+          </a:ln>
+          <a:effectLst/>
+          <a:scene3d>
+            <a:camera prst="isometricTopUp"/>
+            <a:lightRig rig="threePt" dir="t"/>
+          </a:scene3d>
+        </p:spPr>
+        <p:style>
+          <a:lnRef idx="2">
+            <a:schemeClr val="accent1">
+              <a:shade val="50000"/>
+            </a:schemeClr>
+          </a:lnRef>
+          <a:fillRef idx="1">
+            <a:schemeClr val="accent1"/>
+          </a:fillRef>
+          <a:effectRef idx="0">
+            <a:schemeClr val="accent1"/>
+          </a:effectRef>
+          <a:fontRef idx="minor">
+            <a:schemeClr val="lt1"/>
+          </a:fontRef>
+        </p:style>
+        <p:txBody>
+          <a:bodyPr rtlCol="0" anchor="ctr" anchorCtr="0"/>
+          <a:lstStyle/>
+          <a:p>
+            <a:endParaRPr lang="en-US" sz="1200" i="1" noProof="1">
+              <a:solidFill>
+                <a:schemeClr val="bg1"/>
+              </a:solidFill>
+              <a:latin typeface="+mj-lt"/>
+            </a:endParaRPr>
+          </a:p>
+        </p:txBody>
+      </p:sp>
+      <p:sp>
+        <p:nvSpPr>
+          <p:cNvPr id="88" name="Abgerundetes Rechteck 87"/>
+          <p:cNvSpPr>
+            <a:spLocks noChangeAspect="1"/>
+          </p:cNvSpPr>
+          <p:nvPr/>
+        </p:nvSpPr>
+        <p:spPr>
+          <a:xfrm>
+            <a:off x="5176370" y="1279390"/>
+            <a:ext cx="176566" cy="176566"/>
+          </a:xfrm>
+          <a:prstGeom prst="roundRect">
+            <a:avLst/>
+          </a:prstGeom>
+          <a:solidFill>
+            <a:schemeClr val="accent4">
+              <a:lumMod val="60000"/>
+              <a:lumOff val="40000"/>
+            </a:schemeClr>
+          </a:solidFill>
+          <a:ln w="3175">
+            <a:noFill/>
+            <a:prstDash val="sysDot"/>
+          </a:ln>
+          <a:effectLst/>
+          <a:scene3d>
+            <a:camera prst="isometricTopUp"/>
+            <a:lightRig rig="threePt" dir="t"/>
+          </a:scene3d>
+        </p:spPr>
+        <p:style>
+          <a:lnRef idx="2">
+            <a:schemeClr val="accent1">
+              <a:shade val="50000"/>
+            </a:schemeClr>
+          </a:lnRef>
+          <a:fillRef idx="1">
+            <a:schemeClr val="accent1"/>
+          </a:fillRef>
+          <a:effectRef idx="0">
+            <a:schemeClr val="accent1"/>
+          </a:effectRef>
+          <a:fontRef idx="minor">
+            <a:schemeClr val="lt1"/>
+          </a:fontRef>
+        </p:style>
+        <p:txBody>
+          <a:bodyPr rtlCol="0" anchor="ctr" anchorCtr="0"/>
+          <a:lstStyle/>
+          <a:p>
+            <a:endParaRPr lang="en-US" sz="1200" i="1" noProof="1">
+              <a:solidFill>
+                <a:schemeClr val="bg1"/>
+              </a:solidFill>
+              <a:latin typeface="+mj-lt"/>
+            </a:endParaRPr>
+          </a:p>
+        </p:txBody>
+      </p:sp>
+      <p:sp>
+        <p:nvSpPr>
+          <p:cNvPr id="89" name="Abgerundetes Rechteck 88"/>
+          <p:cNvSpPr>
+            <a:spLocks noChangeAspect="1"/>
+          </p:cNvSpPr>
+          <p:nvPr/>
+        </p:nvSpPr>
+        <p:spPr>
+          <a:xfrm>
+            <a:off x="5811441" y="1645624"/>
+            <a:ext cx="176566" cy="176566"/>
+          </a:xfrm>
+          <a:prstGeom prst="roundRect">
+            <a:avLst/>
+          </a:prstGeom>
+          <a:solidFill>
+            <a:schemeClr val="accent4">
+              <a:lumMod val="60000"/>
+              <a:lumOff val="40000"/>
+            </a:schemeClr>
+          </a:solidFill>
+          <a:ln w="3175">
+            <a:noFill/>
+            <a:prstDash val="sysDot"/>
+          </a:ln>
+          <a:effectLst/>
+          <a:scene3d>
+            <a:camera prst="isometricTopUp"/>
+            <a:lightRig rig="threePt" dir="t"/>
+          </a:scene3d>
+        </p:spPr>
+        <p:style>
+          <a:lnRef idx="2">
+            <a:schemeClr val="accent1">
+              <a:shade val="50000"/>
+            </a:schemeClr>
+          </a:lnRef>
+          <a:fillRef idx="1">
+            <a:schemeClr val="accent1"/>
+          </a:fillRef>
+          <a:effectRef idx="0">
+            <a:schemeClr val="accent1"/>
+          </a:effectRef>
+          <a:fontRef idx="minor">
+            <a:schemeClr val="lt1"/>
+          </a:fontRef>
+        </p:style>
+        <p:txBody>
+          <a:bodyPr rtlCol="0" anchor="ctr" anchorCtr="0"/>
+          <a:lstStyle/>
+          <a:p>
+            <a:endParaRPr lang="en-US" sz="1200" i="1" noProof="1">
+              <a:solidFill>
+                <a:schemeClr val="bg1"/>
+              </a:solidFill>
+              <a:latin typeface="+mj-lt"/>
+            </a:endParaRPr>
+          </a:p>
+        </p:txBody>
+      </p:sp>
+      <p:sp>
+        <p:nvSpPr>
+          <p:cNvPr id="90" name="Abgerundetes Rechteck 89"/>
+          <p:cNvSpPr>
+            <a:spLocks noChangeAspect="1"/>
+          </p:cNvSpPr>
+          <p:nvPr/>
+        </p:nvSpPr>
+        <p:spPr>
+          <a:xfrm>
+            <a:off x="6009564" y="1759101"/>
+            <a:ext cx="176566" cy="176566"/>
+          </a:xfrm>
+          <a:prstGeom prst="roundRect">
+            <a:avLst/>
+          </a:prstGeom>
+          <a:solidFill>
+            <a:schemeClr val="accent4">
+              <a:lumMod val="60000"/>
+              <a:lumOff val="40000"/>
+            </a:schemeClr>
+          </a:solidFill>
+          <a:ln w="3175">
+            <a:noFill/>
+            <a:prstDash val="sysDot"/>
+          </a:ln>
+          <a:effectLst/>
+          <a:scene3d>
+            <a:camera prst="isometricTopUp"/>
+            <a:lightRig rig="threePt" dir="t"/>
+          </a:scene3d>
+        </p:spPr>
+        <p:style>
+          <a:lnRef idx="2">
+            <a:schemeClr val="accent1">
+              <a:shade val="50000"/>
+            </a:schemeClr>
+          </a:lnRef>
+          <a:fillRef idx="1">
+            <a:schemeClr val="accent1"/>
+          </a:fillRef>
+          <a:effectRef idx="0">
+            <a:schemeClr val="accent1"/>
+          </a:effectRef>
+          <a:fontRef idx="minor">
+            <a:schemeClr val="lt1"/>
+          </a:fontRef>
+        </p:style>
+        <p:txBody>
+          <a:bodyPr rtlCol="0" anchor="ctr" anchorCtr="0"/>
+          <a:lstStyle/>
+          <a:p>
+            <a:endParaRPr lang="en-US" sz="1200" i="1" noProof="1">
+              <a:solidFill>
+                <a:schemeClr val="bg1"/>
+              </a:solidFill>
+              <a:latin typeface="+mj-lt"/>
+            </a:endParaRPr>
+          </a:p>
+        </p:txBody>
+      </p:sp>
+      <p:sp>
+        <p:nvSpPr>
+          <p:cNvPr id="91" name="Abgerundetes Rechteck 90"/>
+          <p:cNvSpPr>
+            <a:spLocks noChangeAspect="1"/>
+          </p:cNvSpPr>
+          <p:nvPr/>
+        </p:nvSpPr>
+        <p:spPr>
+          <a:xfrm>
+            <a:off x="6208636" y="1876651"/>
+            <a:ext cx="176566" cy="176566"/>
+          </a:xfrm>
+          <a:prstGeom prst="roundRect">
+            <a:avLst/>
+          </a:prstGeom>
+          <a:solidFill>
+            <a:schemeClr val="accent4">
+              <a:lumMod val="60000"/>
+              <a:lumOff val="40000"/>
+            </a:schemeClr>
+          </a:solidFill>
+          <a:ln w="3175">
+            <a:noFill/>
+            <a:prstDash val="sysDot"/>
+          </a:ln>
+          <a:effectLst/>
+          <a:scene3d>
+            <a:camera prst="isometricTopUp"/>
+            <a:lightRig rig="threePt" dir="t"/>
+          </a:scene3d>
+        </p:spPr>
+        <p:style>
+          <a:lnRef idx="2">
+            <a:schemeClr val="accent1">
+              <a:shade val="50000"/>
+            </a:schemeClr>
+          </a:lnRef>
+          <a:fillRef idx="1">
+            <a:schemeClr val="accent1"/>
+          </a:fillRef>
+          <a:effectRef idx="0">
+            <a:schemeClr val="accent1"/>
+          </a:effectRef>
+          <a:fontRef idx="minor">
+            <a:schemeClr val="lt1"/>
+          </a:fontRef>
+        </p:style>
+        <p:txBody>
+          <a:bodyPr rtlCol="0" anchor="ctr" anchorCtr="0"/>
+          <a:lstStyle/>
+          <a:p>
+            <a:endParaRPr lang="en-US" sz="1200" i="1" noProof="1">
+              <a:solidFill>
+                <a:schemeClr val="bg1"/>
+              </a:solidFill>
+              <a:latin typeface="+mj-lt"/>
+            </a:endParaRPr>
+          </a:p>
+        </p:txBody>
+      </p:sp>
+      <p:sp>
+        <p:nvSpPr>
+          <p:cNvPr id="92" name="Abgerundetes Rechteck 91"/>
+          <p:cNvSpPr>
+            <a:spLocks noChangeAspect="1"/>
+          </p:cNvSpPr>
+          <p:nvPr/>
+        </p:nvSpPr>
+        <p:spPr>
+          <a:xfrm>
+            <a:off x="6911984" y="2263831"/>
+            <a:ext cx="176566" cy="176566"/>
+          </a:xfrm>
+          <a:prstGeom prst="roundRect">
+            <a:avLst/>
+          </a:prstGeom>
+          <a:solidFill>
+            <a:schemeClr val="accent4">
+              <a:lumMod val="60000"/>
+              <a:lumOff val="40000"/>
+            </a:schemeClr>
+          </a:solidFill>
+          <a:ln w="3175">
+            <a:noFill/>
+            <a:prstDash val="sysDot"/>
+          </a:ln>
+          <a:effectLst/>
+          <a:scene3d>
+            <a:camera prst="isometricTopUp"/>
+            <a:lightRig rig="threePt" dir="t"/>
+          </a:scene3d>
+        </p:spPr>
+        <p:style>
+          <a:lnRef idx="2">
+            <a:schemeClr val="accent1">
+              <a:shade val="50000"/>
+            </a:schemeClr>
+          </a:lnRef>
+          <a:fillRef idx="1">
+            <a:schemeClr val="accent1"/>
+          </a:fillRef>
+          <a:effectRef idx="0">
+            <a:schemeClr val="accent1"/>
+          </a:effectRef>
+          <a:fontRef idx="minor">
+            <a:schemeClr val="lt1"/>
+          </a:fontRef>
+        </p:style>
+        <p:txBody>
+          <a:bodyPr rtlCol="0" anchor="ctr" anchorCtr="0"/>
+          <a:lstStyle/>
+          <a:p>
+            <a:endParaRPr lang="en-US" sz="1200" i="1" noProof="1">
+              <a:solidFill>
+                <a:schemeClr val="bg1"/>
+              </a:solidFill>
+              <a:latin typeface="+mj-lt"/>
+            </a:endParaRPr>
+          </a:p>
+        </p:txBody>
+      </p:sp>
+      <p:sp>
+        <p:nvSpPr>
+          <p:cNvPr id="94" name="Abgerundetes Rechteck 93"/>
+          <p:cNvSpPr>
+            <a:spLocks noChangeAspect="1"/>
+          </p:cNvSpPr>
+          <p:nvPr/>
+        </p:nvSpPr>
+        <p:spPr>
+          <a:xfrm>
+            <a:off x="7110107" y="2377308"/>
+            <a:ext cx="176566" cy="176566"/>
+          </a:xfrm>
+          <a:prstGeom prst="roundRect">
+            <a:avLst/>
+          </a:prstGeom>
+          <a:solidFill>
+            <a:schemeClr val="accent4">
+              <a:lumMod val="60000"/>
+              <a:lumOff val="40000"/>
+            </a:schemeClr>
+          </a:solidFill>
+          <a:ln w="3175">
+            <a:noFill/>
+            <a:prstDash val="sysDot"/>
+          </a:ln>
+          <a:effectLst/>
+          <a:scene3d>
+            <a:camera prst="isometricTopUp"/>
+            <a:lightRig rig="threePt" dir="t"/>
+          </a:scene3d>
+        </p:spPr>
+        <p:style>
+          <a:lnRef idx="2">
+            <a:schemeClr val="accent1">
+              <a:shade val="50000"/>
+            </a:schemeClr>
+          </a:lnRef>
+          <a:fillRef idx="1">
+            <a:schemeClr val="accent1"/>
+          </a:fillRef>
+          <a:effectRef idx="0">
+            <a:schemeClr val="accent1"/>
+          </a:effectRef>
+          <a:fontRef idx="minor">
+            <a:schemeClr val="lt1"/>
+          </a:fontRef>
+        </p:style>
+        <p:txBody>
+          <a:bodyPr rtlCol="0" anchor="ctr" anchorCtr="0"/>
+          <a:lstStyle/>
+          <a:p>
+            <a:endParaRPr lang="en-US" sz="1200" i="1" noProof="1">
+              <a:solidFill>
+                <a:schemeClr val="bg1"/>
+              </a:solidFill>
+              <a:latin typeface="+mj-lt"/>
+            </a:endParaRPr>
+          </a:p>
+        </p:txBody>
+      </p:sp>
+      <p:sp>
+        <p:nvSpPr>
+          <p:cNvPr id="96" name="Abgerundetes Rechteck 95"/>
+          <p:cNvSpPr>
+            <a:spLocks noChangeAspect="1"/>
+          </p:cNvSpPr>
+          <p:nvPr/>
+        </p:nvSpPr>
+        <p:spPr>
+          <a:xfrm>
+            <a:off x="7309179" y="2494858"/>
+            <a:ext cx="176566" cy="176566"/>
+          </a:xfrm>
+          <a:prstGeom prst="roundRect">
+            <a:avLst/>
+          </a:prstGeom>
+          <a:solidFill>
+            <a:schemeClr val="accent4">
+              <a:lumMod val="60000"/>
+              <a:lumOff val="40000"/>
+            </a:schemeClr>
+          </a:solidFill>
+          <a:ln w="3175">
+            <a:noFill/>
+            <a:prstDash val="sysDot"/>
+          </a:ln>
+          <a:effectLst/>
+          <a:scene3d>
+            <a:camera prst="isometricTopUp"/>
+            <a:lightRig rig="threePt" dir="t"/>
+          </a:scene3d>
+        </p:spPr>
+        <p:style>
+          <a:lnRef idx="2">
+            <a:schemeClr val="accent1">
+              <a:shade val="50000"/>
+            </a:schemeClr>
+          </a:lnRef>
+          <a:fillRef idx="1">
+            <a:schemeClr val="accent1"/>
+          </a:fillRef>
+          <a:effectRef idx="0">
+            <a:schemeClr val="accent1"/>
+          </a:effectRef>
+          <a:fontRef idx="minor">
+            <a:schemeClr val="lt1"/>
+          </a:fontRef>
+        </p:style>
+        <p:txBody>
+          <a:bodyPr rtlCol="0" anchor="ctr" anchorCtr="0"/>
+          <a:lstStyle/>
+          <a:p>
+            <a:endParaRPr lang="en-US" sz="1200" i="1" noProof="1">
+              <a:solidFill>
+                <a:schemeClr val="bg1"/>
+              </a:solidFill>
+              <a:latin typeface="+mj-lt"/>
+            </a:endParaRPr>
+          </a:p>
+        </p:txBody>
+      </p:sp>
+      <p:sp>
+        <p:nvSpPr>
+          <p:cNvPr id="97" name="Abgerundetes Rechteck 96"/>
+          <p:cNvSpPr>
+            <a:spLocks noChangeAspect="1"/>
+          </p:cNvSpPr>
+          <p:nvPr/>
+        </p:nvSpPr>
+        <p:spPr>
+          <a:xfrm>
+            <a:off x="8002366" y="2882667"/>
+            <a:ext cx="176566" cy="176566"/>
+          </a:xfrm>
+          <a:prstGeom prst="roundRect">
+            <a:avLst/>
+          </a:prstGeom>
+          <a:solidFill>
+            <a:schemeClr val="accent4">
+              <a:lumMod val="60000"/>
+              <a:lumOff val="40000"/>
+            </a:schemeClr>
+          </a:solidFill>
+          <a:ln w="3175">
+            <a:noFill/>
+            <a:prstDash val="sysDot"/>
+          </a:ln>
+          <a:effectLst/>
+          <a:scene3d>
+            <a:camera prst="isometricTopUp"/>
+            <a:lightRig rig="threePt" dir="t"/>
+          </a:scene3d>
+        </p:spPr>
+        <p:style>
+          <a:lnRef idx="2">
+            <a:schemeClr val="accent1">
+              <a:shade val="50000"/>
+            </a:schemeClr>
+          </a:lnRef>
+          <a:fillRef idx="1">
+            <a:schemeClr val="accent1"/>
+          </a:fillRef>
+          <a:effectRef idx="0">
+            <a:schemeClr val="accent1"/>
+          </a:effectRef>
+          <a:fontRef idx="minor">
+            <a:schemeClr val="lt1"/>
+          </a:fontRef>
+        </p:style>
+        <p:txBody>
+          <a:bodyPr rtlCol="0" anchor="ctr" anchorCtr="0"/>
+          <a:lstStyle/>
+          <a:p>
+            <a:endParaRPr lang="en-US" sz="1200" i="1" noProof="1">
+              <a:solidFill>
+                <a:schemeClr val="bg1"/>
+              </a:solidFill>
+              <a:latin typeface="+mj-lt"/>
+            </a:endParaRPr>
+          </a:p>
+        </p:txBody>
+      </p:sp>
+      <p:sp>
+        <p:nvSpPr>
+          <p:cNvPr id="98" name="Abgerundetes Rechteck 97"/>
+          <p:cNvSpPr>
+            <a:spLocks noChangeAspect="1"/>
+          </p:cNvSpPr>
+          <p:nvPr/>
+        </p:nvSpPr>
+        <p:spPr>
+          <a:xfrm>
+            <a:off x="8200489" y="2996144"/>
+            <a:ext cx="176566" cy="176566"/>
+          </a:xfrm>
+          <a:prstGeom prst="roundRect">
+            <a:avLst/>
+          </a:prstGeom>
+          <a:solidFill>
+            <a:schemeClr val="accent4">
+              <a:lumMod val="60000"/>
+              <a:lumOff val="40000"/>
+            </a:schemeClr>
+          </a:solidFill>
+          <a:ln w="3175">
+            <a:noFill/>
+            <a:prstDash val="sysDot"/>
+          </a:ln>
+          <a:effectLst/>
+          <a:scene3d>
+            <a:camera prst="isometricTopUp"/>
+            <a:lightRig rig="threePt" dir="t"/>
+          </a:scene3d>
+        </p:spPr>
+        <p:style>
+          <a:lnRef idx="2">
+            <a:schemeClr val="accent1">
+              <a:shade val="50000"/>
+            </a:schemeClr>
+          </a:lnRef>
+          <a:fillRef idx="1">
+            <a:schemeClr val="accent1"/>
+          </a:fillRef>
+          <a:effectRef idx="0">
+            <a:schemeClr val="accent1"/>
+          </a:effectRef>
+          <a:fontRef idx="minor">
+            <a:schemeClr val="lt1"/>
+          </a:fontRef>
+        </p:style>
+        <p:txBody>
+          <a:bodyPr rtlCol="0" anchor="ctr" anchorCtr="0"/>
+          <a:lstStyle/>
+          <a:p>
+            <a:endParaRPr lang="en-US" sz="1200" i="1" noProof="1">
+              <a:solidFill>
+                <a:schemeClr val="bg1"/>
+              </a:solidFill>
+              <a:latin typeface="+mj-lt"/>
+            </a:endParaRPr>
+          </a:p>
+        </p:txBody>
+      </p:sp>
+      <p:sp>
+        <p:nvSpPr>
+          <p:cNvPr id="99" name="Abgerundetes Rechteck 98"/>
+          <p:cNvSpPr>
+            <a:spLocks noChangeAspect="1"/>
+          </p:cNvSpPr>
+          <p:nvPr/>
+        </p:nvSpPr>
+        <p:spPr>
+          <a:xfrm>
+            <a:off x="8399561" y="3113694"/>
+            <a:ext cx="176566" cy="176566"/>
+          </a:xfrm>
+          <a:prstGeom prst="roundRect">
+            <a:avLst/>
+          </a:prstGeom>
+          <a:solidFill>
+            <a:schemeClr val="accent4">
+              <a:lumMod val="60000"/>
+              <a:lumOff val="40000"/>
+            </a:schemeClr>
+          </a:solidFill>
+          <a:ln w="3175">
+            <a:noFill/>
+            <a:prstDash val="sysDot"/>
+          </a:ln>
+          <a:effectLst/>
+          <a:scene3d>
+            <a:camera prst="isometricTopUp"/>
+            <a:lightRig rig="threePt" dir="t"/>
+          </a:scene3d>
+        </p:spPr>
+        <p:style>
+          <a:lnRef idx="2">
+            <a:schemeClr val="accent1">
+              <a:shade val="50000"/>
+            </a:schemeClr>
+          </a:lnRef>
+          <a:fillRef idx="1">
+            <a:schemeClr val="accent1"/>
+          </a:fillRef>
+          <a:effectRef idx="0">
+            <a:schemeClr val="accent1"/>
+          </a:effectRef>
+          <a:fontRef idx="minor">
+            <a:schemeClr val="lt1"/>
+          </a:fontRef>
+        </p:style>
+        <p:txBody>
+          <a:bodyPr rtlCol="0" anchor="ctr" anchorCtr="0"/>
+          <a:lstStyle/>
+          <a:p>
+            <a:endParaRPr lang="en-US" sz="1200" i="1" noProof="1">
+              <a:solidFill>
+                <a:schemeClr val="bg1"/>
+              </a:solidFill>
+              <a:latin typeface="+mj-lt"/>
+            </a:endParaRPr>
+          </a:p>
+        </p:txBody>
+      </p:sp>
     </p:spTree>
     <p:extLst>
       <p:ext uri="{BB962C8B-B14F-4D97-AF65-F5344CB8AC3E}">
@@ -35927,7 +36674,9 @@
             <a:ext cx="1338943" cy="659675"/>
           </a:xfrm>
           <a:prstGeom prst="roundRect">
-            <a:avLst/>
+            <a:avLst>
+              <a:gd name="adj" fmla="val 0"/>
+            </a:avLst>
           </a:prstGeom>
           <a:solidFill>
             <a:schemeClr val="accent2">
@@ -35979,7 +36728,9 @@
             <a:ext cx="1338943" cy="659675"/>
           </a:xfrm>
           <a:prstGeom prst="roundRect">
-            <a:avLst/>
+            <a:avLst>
+              <a:gd name="adj" fmla="val 0"/>
+            </a:avLst>
           </a:prstGeom>
           <a:solidFill>
             <a:schemeClr val="accent2">
@@ -36031,7 +36782,9 @@
             <a:ext cx="1338943" cy="659675"/>
           </a:xfrm>
           <a:prstGeom prst="roundRect">
-            <a:avLst/>
+            <a:avLst>
+              <a:gd name="adj" fmla="val 0"/>
+            </a:avLst>
           </a:prstGeom>
           <a:solidFill>
             <a:schemeClr val="accent2">
@@ -36263,245 +37016,19 @@
           </a:p>
         </p:txBody>
       </p:sp>
-      <p:sp>
-        <p:nvSpPr>
-          <p:cNvPr id="20" name="Abgerundetes Rechteck 19"/>
-          <p:cNvSpPr/>
-          <p:nvPr/>
-        </p:nvSpPr>
-        <p:spPr>
-          <a:xfrm>
-            <a:off x="5664924" y="2663190"/>
-            <a:ext cx="1338943" cy="374469"/>
-          </a:xfrm>
-          <a:prstGeom prst="roundRect">
-            <a:avLst>
-              <a:gd name="adj" fmla="val 50000"/>
-            </a:avLst>
-          </a:prstGeom>
-          <a:solidFill>
-            <a:schemeClr val="accent4">
-              <a:lumMod val="40000"/>
-              <a:lumOff val="60000"/>
-            </a:schemeClr>
-          </a:solidFill>
-          <a:ln w="3175">
-            <a:solidFill>
-              <a:schemeClr val="bg1"/>
-            </a:solidFill>
-            <a:prstDash val="solid"/>
-          </a:ln>
-        </p:spPr>
-        <p:style>
-          <a:lnRef idx="2">
-            <a:schemeClr val="accent1">
-              <a:shade val="50000"/>
-            </a:schemeClr>
-          </a:lnRef>
-          <a:fillRef idx="1">
-            <a:schemeClr val="accent1"/>
-          </a:fillRef>
-          <a:effectRef idx="0">
-            <a:schemeClr val="accent1"/>
-          </a:effectRef>
-          <a:fontRef idx="minor">
-            <a:schemeClr val="lt1"/>
-          </a:fontRef>
-        </p:style>
-        <p:txBody>
-          <a:bodyPr rtlCol="0" anchor="ctr"/>
-          <a:lstStyle/>
-          <a:p>
-            <a:pPr algn="ctr"/>
-            <a:r>
-              <a:rPr lang="en-US" sz="1200" dirty="0" smtClean="0">
-                <a:solidFill>
-                  <a:schemeClr val="accent4">
-                    <a:lumMod val="50000"/>
-                  </a:schemeClr>
-                </a:solidFill>
-                <a:latin typeface="+mj-lt"/>
-              </a:rPr>
-              <a:t>Topic</a:t>
-            </a:r>
-            <a:endParaRPr lang="en-US" sz="1200" dirty="0">
-              <a:solidFill>
-                <a:schemeClr val="accent4">
-                  <a:lumMod val="50000"/>
-                </a:schemeClr>
-              </a:solidFill>
-              <a:latin typeface="+mj-lt"/>
-            </a:endParaRPr>
-          </a:p>
-        </p:txBody>
-      </p:sp>
-      <p:sp>
-        <p:nvSpPr>
-          <p:cNvPr id="21" name="Abgerundetes Rechteck 20"/>
-          <p:cNvSpPr/>
-          <p:nvPr/>
-        </p:nvSpPr>
-        <p:spPr>
-          <a:xfrm>
-            <a:off x="5664925" y="3202577"/>
-            <a:ext cx="1338943" cy="374469"/>
-          </a:xfrm>
-          <a:prstGeom prst="roundRect">
-            <a:avLst>
-              <a:gd name="adj" fmla="val 50000"/>
-            </a:avLst>
-          </a:prstGeom>
-          <a:solidFill>
-            <a:schemeClr val="accent4">
-              <a:lumMod val="40000"/>
-              <a:lumOff val="60000"/>
-              <a:alpha val="59000"/>
-            </a:schemeClr>
-          </a:solidFill>
-          <a:ln w="3175">
-            <a:solidFill>
-              <a:schemeClr val="bg1">
-                <a:alpha val="78000"/>
-              </a:schemeClr>
-            </a:solidFill>
-            <a:prstDash val="solid"/>
-          </a:ln>
-        </p:spPr>
-        <p:style>
-          <a:lnRef idx="2">
-            <a:schemeClr val="accent1">
-              <a:shade val="50000"/>
-            </a:schemeClr>
-          </a:lnRef>
-          <a:fillRef idx="1">
-            <a:schemeClr val="accent1"/>
-          </a:fillRef>
-          <a:effectRef idx="0">
-            <a:schemeClr val="accent1"/>
-          </a:effectRef>
-          <a:fontRef idx="minor">
-            <a:schemeClr val="lt1"/>
-          </a:fontRef>
-        </p:style>
-        <p:txBody>
-          <a:bodyPr rtlCol="0" anchor="ctr"/>
-          <a:lstStyle/>
-          <a:p>
-            <a:pPr algn="ctr"/>
-            <a:r>
-              <a:rPr lang="en-US" sz="1200" dirty="0" smtClean="0">
-                <a:solidFill>
-                  <a:schemeClr val="accent4">
-                    <a:lumMod val="50000"/>
-                    <a:alpha val="54000"/>
-                  </a:schemeClr>
-                </a:solidFill>
-                <a:latin typeface="+mj-lt"/>
-              </a:rPr>
-              <a:t>Topic</a:t>
-            </a:r>
-            <a:endParaRPr lang="en-US" sz="1200" dirty="0">
-              <a:solidFill>
-                <a:schemeClr val="accent4">
-                  <a:lumMod val="50000"/>
-                  <a:alpha val="54000"/>
-                </a:schemeClr>
-              </a:solidFill>
-              <a:latin typeface="+mj-lt"/>
-            </a:endParaRPr>
-          </a:p>
-        </p:txBody>
-      </p:sp>
-      <p:sp>
-        <p:nvSpPr>
-          <p:cNvPr id="22" name="Abgerundetes Rechteck 21"/>
-          <p:cNvSpPr/>
-          <p:nvPr/>
-        </p:nvSpPr>
-        <p:spPr>
-          <a:xfrm>
-            <a:off x="5664925" y="2153193"/>
-            <a:ext cx="1338943" cy="374469"/>
-          </a:xfrm>
-          <a:prstGeom prst="roundRect">
-            <a:avLst>
-              <a:gd name="adj" fmla="val 50000"/>
-            </a:avLst>
-          </a:prstGeom>
-          <a:solidFill>
-            <a:schemeClr val="accent4">
-              <a:lumMod val="40000"/>
-              <a:lumOff val="60000"/>
-              <a:alpha val="59000"/>
-            </a:schemeClr>
-          </a:solidFill>
-          <a:ln w="3175">
-            <a:solidFill>
-              <a:schemeClr val="bg1">
-                <a:alpha val="78000"/>
-              </a:schemeClr>
-            </a:solidFill>
-            <a:prstDash val="solid"/>
-          </a:ln>
-        </p:spPr>
-        <p:style>
-          <a:lnRef idx="2">
-            <a:schemeClr val="accent1">
-              <a:shade val="50000"/>
-            </a:schemeClr>
-          </a:lnRef>
-          <a:fillRef idx="1">
-            <a:schemeClr val="accent1"/>
-          </a:fillRef>
-          <a:effectRef idx="0">
-            <a:schemeClr val="accent1"/>
-          </a:effectRef>
-          <a:fontRef idx="minor">
-            <a:schemeClr val="lt1"/>
-          </a:fontRef>
-        </p:style>
-        <p:txBody>
-          <a:bodyPr rtlCol="0" anchor="ctr"/>
-          <a:lstStyle/>
-          <a:p>
-            <a:pPr algn="ctr"/>
-            <a:r>
-              <a:rPr lang="en-US" sz="1200" dirty="0" smtClean="0">
-                <a:solidFill>
-                  <a:schemeClr val="accent4">
-                    <a:lumMod val="50000"/>
-                    <a:alpha val="54000"/>
-                  </a:schemeClr>
-                </a:solidFill>
-                <a:latin typeface="+mj-lt"/>
-              </a:rPr>
-              <a:t>Topic</a:t>
-            </a:r>
-            <a:endParaRPr lang="en-US" sz="1200" dirty="0">
-              <a:solidFill>
-                <a:schemeClr val="accent4">
-                  <a:lumMod val="50000"/>
-                  <a:alpha val="54000"/>
-                </a:schemeClr>
-              </a:solidFill>
-              <a:latin typeface="+mj-lt"/>
-            </a:endParaRPr>
-          </a:p>
-        </p:txBody>
-      </p:sp>
       <p:cxnSp>
         <p:nvCxnSpPr>
           <p:cNvPr id="24" name="Gerade Verbindung mit Pfeil 23"/>
           <p:cNvCxnSpPr>
             <a:stCxn id="7" idx="3"/>
-            <a:endCxn id="20" idx="1"/>
+            <a:endCxn id="38" idx="1"/>
           </p:cNvCxnSpPr>
           <p:nvPr/>
         </p:nvCxnSpPr>
         <p:spPr>
           <a:xfrm flipV="1">
-            <a:off x="2416637" y="2850425"/>
-            <a:ext cx="3248287" cy="4901"/>
+            <a:off x="2416637" y="2846617"/>
+            <a:ext cx="3060165" cy="8709"/>
           </a:xfrm>
           <a:prstGeom prst="straightConnector1">
             <a:avLst/>
@@ -36536,15 +37063,15 @@
         <p:nvCxnSpPr>
           <p:cNvPr id="25" name="Gerade Verbindung mit Pfeil 24"/>
           <p:cNvCxnSpPr>
-            <a:stCxn id="20" idx="3"/>
+            <a:stCxn id="38" idx="3"/>
             <a:endCxn id="15" idx="1"/>
           </p:cNvCxnSpPr>
           <p:nvPr/>
         </p:nvCxnSpPr>
         <p:spPr>
           <a:xfrm>
-            <a:off x="7003867" y="2850425"/>
-            <a:ext cx="3126377" cy="0"/>
+            <a:off x="7169330" y="2846617"/>
+            <a:ext cx="2960914" cy="3808"/>
           </a:xfrm>
           <a:prstGeom prst="straightConnector1">
             <a:avLst/>
@@ -36588,14 +37115,14 @@
           <a:prstGeom prst="rect">
             <a:avLst/>
           </a:prstGeom>
-          <a:noFill/>
+          <a:solidFill>
+            <a:schemeClr val="tx2">
+              <a:lumMod val="20000"/>
+              <a:lumOff val="80000"/>
+            </a:schemeClr>
+          </a:solidFill>
           <a:ln w="3175">
-            <a:solidFill>
-              <a:schemeClr val="tx2">
-                <a:lumMod val="60000"/>
-                <a:lumOff val="40000"/>
-              </a:schemeClr>
-            </a:solidFill>
+            <a:noFill/>
             <a:prstDash val="sysDot"/>
           </a:ln>
         </p:spPr>
@@ -36650,8 +37177,8 @@
         </p:nvSpPr>
         <p:spPr>
           <a:xfrm>
-            <a:off x="2752697" y="2509741"/>
-            <a:ext cx="1076898" cy="276999"/>
+            <a:off x="2535397" y="2378471"/>
+            <a:ext cx="870751" cy="461665"/>
           </a:xfrm>
           <a:prstGeom prst="rect">
             <a:avLst/>
@@ -36673,7 +37200,31 @@
                 </a:solidFill>
                 <a:latin typeface="+mj-lt"/>
               </a:rPr>
-              <a:t>publishes data</a:t>
+              <a:t>publishes </a:t>
+            </a:r>
+            <a:r>
+              <a:rPr lang="en-US" sz="1200" i="1" dirty="0" smtClean="0">
+                <a:solidFill>
+                  <a:schemeClr val="bg2">
+                    <a:lumMod val="75000"/>
+                  </a:schemeClr>
+                </a:solidFill>
+                <a:latin typeface="+mj-lt"/>
+              </a:rPr>
+              <a:t>a</a:t>
+            </a:r>
+          </a:p>
+          <a:p>
+            <a:r>
+              <a:rPr lang="en-US" sz="1200" i="1" dirty="0" smtClean="0">
+                <a:solidFill>
+                  <a:schemeClr val="bg2">
+                    <a:lumMod val="75000"/>
+                  </a:schemeClr>
+                </a:solidFill>
+                <a:latin typeface="+mj-lt"/>
+              </a:rPr>
+              <a:t>message</a:t>
             </a:r>
             <a:endParaRPr lang="en-US" sz="1200" i="1" dirty="0">
               <a:solidFill>
@@ -36694,8 +37245,8 @@
         </p:nvSpPr>
         <p:spPr>
           <a:xfrm>
-            <a:off x="8233953" y="2509741"/>
-            <a:ext cx="995978" cy="276999"/>
+            <a:off x="8761458" y="2413362"/>
+            <a:ext cx="1184818" cy="461665"/>
           </a:xfrm>
           <a:prstGeom prst="rect">
             <a:avLst/>
@@ -36703,11 +37254,12 @@
           <a:noFill/>
         </p:spPr>
         <p:txBody>
-          <a:bodyPr wrap="none" rtlCol="0">
+          <a:bodyPr wrap="square" rtlCol="0">
             <a:spAutoFit/>
           </a:bodyPr>
           <a:lstStyle/>
           <a:p>
+            <a:pPr algn="r"/>
             <a:r>
               <a:rPr lang="en-US" sz="1200" i="1" dirty="0" smtClean="0">
                 <a:solidFill>
@@ -36717,7 +37269,29 @@
                 </a:solidFill>
                 <a:latin typeface="+mj-lt"/>
               </a:rPr>
-              <a:t>receives data</a:t>
+              <a:t>receives </a:t>
+            </a:r>
+            <a:endParaRPr lang="en-US" sz="1200" i="1" dirty="0" smtClean="0">
+              <a:solidFill>
+                <a:schemeClr val="bg2">
+                  <a:lumMod val="75000"/>
+                </a:schemeClr>
+              </a:solidFill>
+              <a:latin typeface="+mj-lt"/>
+            </a:endParaRPr>
+          </a:p>
+          <a:p>
+            <a:pPr algn="r"/>
+            <a:r>
+              <a:rPr lang="en-US" sz="1200" i="1" dirty="0" smtClean="0">
+                <a:solidFill>
+                  <a:schemeClr val="bg2">
+                    <a:lumMod val="75000"/>
+                  </a:schemeClr>
+                </a:solidFill>
+                <a:latin typeface="+mj-lt"/>
+              </a:rPr>
+              <a:t>the message</a:t>
             </a:r>
             <a:endParaRPr lang="en-US" sz="1200" i="1" dirty="0">
               <a:solidFill>
@@ -36739,21 +37313,20 @@
         <p:spPr>
           <a:xfrm>
             <a:off x="4534987" y="5107857"/>
-            <a:ext cx="3546566" cy="416646"/>
+            <a:ext cx="1741716" cy="416646"/>
           </a:xfrm>
           <a:prstGeom prst="rect">
             <a:avLst/>
           </a:prstGeom>
-          <a:solidFill>
-            <a:schemeClr val="tx2">
-              <a:lumMod val="20000"/>
-              <a:lumOff val="80000"/>
-              <a:alpha val="41000"/>
-            </a:schemeClr>
-          </a:solidFill>
+          <a:noFill/>
           <a:ln w="3175">
-            <a:noFill/>
-            <a:prstDash val="sysDot"/>
+            <a:solidFill>
+              <a:schemeClr val="bg1">
+                <a:lumMod val="65000"/>
+                <a:alpha val="46000"/>
+              </a:schemeClr>
+            </a:solidFill>
+            <a:prstDash val="dash"/>
           </a:ln>
         </p:spPr>
         <p:style>
@@ -36813,11 +37386,11 @@
           <a:prstGeom prst="rightBrace">
             <a:avLst/>
           </a:prstGeom>
-          <a:ln>
+          <a:ln w="3175">
             <a:solidFill>
               <a:schemeClr val="tx1"/>
             </a:solidFill>
-            <a:prstDash val="sysDot"/>
+            <a:prstDash val="dash"/>
           </a:ln>
         </p:spPr>
         <p:style>
@@ -37072,6 +37645,917 @@
                   <a:lumMod val="50000"/>
                   <a:lumOff val="50000"/>
                 </a:schemeClr>
+              </a:solidFill>
+              <a:latin typeface="+mj-lt"/>
+            </a:endParaRPr>
+          </a:p>
+        </p:txBody>
+      </p:sp>
+      <p:sp>
+        <p:nvSpPr>
+          <p:cNvPr id="27" name="Rechteck 26"/>
+          <p:cNvSpPr/>
+          <p:nvPr/>
+        </p:nvSpPr>
+        <p:spPr>
+          <a:xfrm>
+            <a:off x="6334395" y="5107857"/>
+            <a:ext cx="1741716" cy="416646"/>
+          </a:xfrm>
+          <a:prstGeom prst="rect">
+            <a:avLst/>
+          </a:prstGeom>
+          <a:noFill/>
+          <a:ln w="3175">
+            <a:solidFill>
+              <a:schemeClr val="bg1">
+                <a:lumMod val="65000"/>
+                <a:alpha val="46000"/>
+              </a:schemeClr>
+            </a:solidFill>
+            <a:prstDash val="dash"/>
+          </a:ln>
+        </p:spPr>
+        <p:style>
+          <a:lnRef idx="2">
+            <a:schemeClr val="accent1">
+              <a:shade val="50000"/>
+            </a:schemeClr>
+          </a:lnRef>
+          <a:fillRef idx="1">
+            <a:schemeClr val="accent1"/>
+          </a:fillRef>
+          <a:effectRef idx="0">
+            <a:schemeClr val="accent1"/>
+          </a:effectRef>
+          <a:fontRef idx="minor">
+            <a:schemeClr val="lt1"/>
+          </a:fontRef>
+        </p:style>
+        <p:txBody>
+          <a:bodyPr rtlCol="0" anchor="ctr" anchorCtr="0"/>
+          <a:lstStyle/>
+          <a:p>
+            <a:pPr algn="ctr"/>
+            <a:r>
+              <a:rPr lang="en-US" sz="1100" dirty="0" smtClean="0">
+                <a:solidFill>
+                  <a:schemeClr val="bg2">
+                    <a:lumMod val="50000"/>
+                  </a:schemeClr>
+                </a:solidFill>
+                <a:latin typeface="+mj-lt"/>
+              </a:rPr>
+              <a:t>REST Proxy</a:t>
+            </a:r>
+            <a:endParaRPr lang="en-US" sz="1100" dirty="0">
+              <a:solidFill>
+                <a:schemeClr val="bg2">
+                  <a:lumMod val="50000"/>
+                </a:schemeClr>
+              </a:solidFill>
+              <a:latin typeface="+mj-lt"/>
+            </a:endParaRPr>
+          </a:p>
+        </p:txBody>
+      </p:sp>
+      <p:sp>
+        <p:nvSpPr>
+          <p:cNvPr id="34" name="Abgerundetes Rechteck 33"/>
+          <p:cNvSpPr/>
+          <p:nvPr/>
+        </p:nvSpPr>
+        <p:spPr>
+          <a:xfrm>
+            <a:off x="5476802" y="2125438"/>
+            <a:ext cx="1692528" cy="374469"/>
+          </a:xfrm>
+          <a:prstGeom prst="roundRect">
+            <a:avLst/>
+          </a:prstGeom>
+          <a:solidFill>
+            <a:srgbClr val="8497B0"/>
+          </a:solidFill>
+          <a:ln w="3175">
+            <a:solidFill>
+              <a:schemeClr val="tx2">
+                <a:lumMod val="40000"/>
+                <a:lumOff val="60000"/>
+              </a:schemeClr>
+            </a:solidFill>
+            <a:prstDash val="sysDot"/>
+          </a:ln>
+          <a:effectLst>
+            <a:outerShdw blurRad="177800" dist="38100" dir="2700000" algn="tl" rotWithShape="0">
+              <a:prstClr val="black">
+                <a:alpha val="25000"/>
+              </a:prstClr>
+            </a:outerShdw>
+          </a:effectLst>
+        </p:spPr>
+        <p:style>
+          <a:lnRef idx="2">
+            <a:schemeClr val="accent1">
+              <a:shade val="50000"/>
+            </a:schemeClr>
+          </a:lnRef>
+          <a:fillRef idx="1">
+            <a:schemeClr val="accent1"/>
+          </a:fillRef>
+          <a:effectRef idx="0">
+            <a:schemeClr val="accent1"/>
+          </a:effectRef>
+          <a:fontRef idx="minor">
+            <a:schemeClr val="lt1"/>
+          </a:fontRef>
+        </p:style>
+        <p:txBody>
+          <a:bodyPr rtlCol="0" anchor="ctr" anchorCtr="0"/>
+          <a:lstStyle/>
+          <a:p>
+            <a:r>
+              <a:rPr lang="en-US" sz="1200" i="1" noProof="1" smtClean="0">
+                <a:solidFill>
+                  <a:schemeClr val="bg1"/>
+                </a:solidFill>
+                <a:latin typeface="+mj-lt"/>
+              </a:rPr>
+              <a:t>topic</a:t>
+            </a:r>
+            <a:endParaRPr lang="en-US" sz="1200" i="1" noProof="1">
+              <a:solidFill>
+                <a:schemeClr val="bg1"/>
+              </a:solidFill>
+              <a:latin typeface="+mj-lt"/>
+            </a:endParaRPr>
+          </a:p>
+        </p:txBody>
+      </p:sp>
+      <p:sp>
+        <p:nvSpPr>
+          <p:cNvPr id="35" name="Abgerundetes Rechteck 34"/>
+          <p:cNvSpPr>
+            <a:spLocks noChangeAspect="1"/>
+          </p:cNvSpPr>
+          <p:nvPr/>
+        </p:nvSpPr>
+        <p:spPr>
+          <a:xfrm>
+            <a:off x="6731900" y="2169713"/>
+            <a:ext cx="283928" cy="283928"/>
+          </a:xfrm>
+          <a:prstGeom prst="roundRect">
+            <a:avLst/>
+          </a:prstGeom>
+          <a:solidFill>
+            <a:schemeClr val="accent4">
+              <a:lumMod val="60000"/>
+              <a:lumOff val="40000"/>
+            </a:schemeClr>
+          </a:solidFill>
+          <a:ln w="3175">
+            <a:noFill/>
+            <a:prstDash val="sysDot"/>
+          </a:ln>
+          <a:effectLst/>
+        </p:spPr>
+        <p:style>
+          <a:lnRef idx="2">
+            <a:schemeClr val="accent1">
+              <a:shade val="50000"/>
+            </a:schemeClr>
+          </a:lnRef>
+          <a:fillRef idx="1">
+            <a:schemeClr val="accent1"/>
+          </a:fillRef>
+          <a:effectRef idx="0">
+            <a:schemeClr val="accent1"/>
+          </a:effectRef>
+          <a:fontRef idx="minor">
+            <a:schemeClr val="lt1"/>
+          </a:fontRef>
+        </p:style>
+        <p:txBody>
+          <a:bodyPr rtlCol="0" anchor="ctr" anchorCtr="0"/>
+          <a:lstStyle/>
+          <a:p>
+            <a:endParaRPr lang="en-US" sz="1200" i="1" noProof="1">
+              <a:solidFill>
+                <a:schemeClr val="bg1"/>
+              </a:solidFill>
+              <a:latin typeface="+mj-lt"/>
+            </a:endParaRPr>
+          </a:p>
+        </p:txBody>
+      </p:sp>
+      <p:sp>
+        <p:nvSpPr>
+          <p:cNvPr id="36" name="Abgerundetes Rechteck 35"/>
+          <p:cNvSpPr>
+            <a:spLocks noChangeAspect="1"/>
+          </p:cNvSpPr>
+          <p:nvPr/>
+        </p:nvSpPr>
+        <p:spPr>
+          <a:xfrm>
+            <a:off x="6370475" y="2169713"/>
+            <a:ext cx="283928" cy="283928"/>
+          </a:xfrm>
+          <a:prstGeom prst="roundRect">
+            <a:avLst/>
+          </a:prstGeom>
+          <a:solidFill>
+            <a:schemeClr val="accent4">
+              <a:lumMod val="60000"/>
+              <a:lumOff val="40000"/>
+            </a:schemeClr>
+          </a:solidFill>
+          <a:ln w="3175">
+            <a:noFill/>
+            <a:prstDash val="sysDot"/>
+          </a:ln>
+          <a:effectLst/>
+        </p:spPr>
+        <p:style>
+          <a:lnRef idx="2">
+            <a:schemeClr val="accent1">
+              <a:shade val="50000"/>
+            </a:schemeClr>
+          </a:lnRef>
+          <a:fillRef idx="1">
+            <a:schemeClr val="accent1"/>
+          </a:fillRef>
+          <a:effectRef idx="0">
+            <a:schemeClr val="accent1"/>
+          </a:effectRef>
+          <a:fontRef idx="minor">
+            <a:schemeClr val="lt1"/>
+          </a:fontRef>
+        </p:style>
+        <p:txBody>
+          <a:bodyPr rtlCol="0" anchor="ctr" anchorCtr="0"/>
+          <a:lstStyle/>
+          <a:p>
+            <a:endParaRPr lang="en-US" sz="1200" i="1" noProof="1">
+              <a:solidFill>
+                <a:schemeClr val="bg1"/>
+              </a:solidFill>
+              <a:latin typeface="+mj-lt"/>
+            </a:endParaRPr>
+          </a:p>
+        </p:txBody>
+      </p:sp>
+      <p:sp>
+        <p:nvSpPr>
+          <p:cNvPr id="37" name="Abgerundetes Rechteck 36"/>
+          <p:cNvSpPr>
+            <a:spLocks noChangeAspect="1"/>
+          </p:cNvSpPr>
+          <p:nvPr/>
+        </p:nvSpPr>
+        <p:spPr>
+          <a:xfrm>
+            <a:off x="5991905" y="2169713"/>
+            <a:ext cx="283928" cy="283928"/>
+          </a:xfrm>
+          <a:prstGeom prst="roundRect">
+            <a:avLst/>
+          </a:prstGeom>
+          <a:solidFill>
+            <a:schemeClr val="accent4">
+              <a:lumMod val="60000"/>
+              <a:lumOff val="40000"/>
+            </a:schemeClr>
+          </a:solidFill>
+          <a:ln w="3175">
+            <a:noFill/>
+            <a:prstDash val="sysDot"/>
+          </a:ln>
+          <a:effectLst/>
+        </p:spPr>
+        <p:style>
+          <a:lnRef idx="2">
+            <a:schemeClr val="accent1">
+              <a:shade val="50000"/>
+            </a:schemeClr>
+          </a:lnRef>
+          <a:fillRef idx="1">
+            <a:schemeClr val="accent1"/>
+          </a:fillRef>
+          <a:effectRef idx="0">
+            <a:schemeClr val="accent1"/>
+          </a:effectRef>
+          <a:fontRef idx="minor">
+            <a:schemeClr val="lt1"/>
+          </a:fontRef>
+        </p:style>
+        <p:txBody>
+          <a:bodyPr rtlCol="0" anchor="ctr" anchorCtr="0"/>
+          <a:lstStyle/>
+          <a:p>
+            <a:endParaRPr lang="en-US" sz="1200" i="1" noProof="1">
+              <a:solidFill>
+                <a:schemeClr val="bg1"/>
+              </a:solidFill>
+              <a:latin typeface="+mj-lt"/>
+            </a:endParaRPr>
+          </a:p>
+        </p:txBody>
+      </p:sp>
+      <p:sp>
+        <p:nvSpPr>
+          <p:cNvPr id="38" name="Abgerundetes Rechteck 37"/>
+          <p:cNvSpPr/>
+          <p:nvPr/>
+        </p:nvSpPr>
+        <p:spPr>
+          <a:xfrm>
+            <a:off x="5476802" y="2659382"/>
+            <a:ext cx="1692528" cy="374469"/>
+          </a:xfrm>
+          <a:prstGeom prst="roundRect">
+            <a:avLst/>
+          </a:prstGeom>
+          <a:solidFill>
+            <a:srgbClr val="8497B0"/>
+          </a:solidFill>
+          <a:ln w="3175">
+            <a:solidFill>
+              <a:schemeClr val="tx2">
+                <a:lumMod val="40000"/>
+                <a:lumOff val="60000"/>
+              </a:schemeClr>
+            </a:solidFill>
+            <a:prstDash val="sysDot"/>
+          </a:ln>
+          <a:effectLst>
+            <a:outerShdw blurRad="177800" dist="38100" dir="2700000" algn="tl" rotWithShape="0">
+              <a:prstClr val="black">
+                <a:alpha val="25000"/>
+              </a:prstClr>
+            </a:outerShdw>
+          </a:effectLst>
+        </p:spPr>
+        <p:style>
+          <a:lnRef idx="2">
+            <a:schemeClr val="accent1">
+              <a:shade val="50000"/>
+            </a:schemeClr>
+          </a:lnRef>
+          <a:fillRef idx="1">
+            <a:schemeClr val="accent1"/>
+          </a:fillRef>
+          <a:effectRef idx="0">
+            <a:schemeClr val="accent1"/>
+          </a:effectRef>
+          <a:fontRef idx="minor">
+            <a:schemeClr val="lt1"/>
+          </a:fontRef>
+        </p:style>
+        <p:txBody>
+          <a:bodyPr rtlCol="0" anchor="ctr" anchorCtr="0"/>
+          <a:lstStyle/>
+          <a:p>
+            <a:r>
+              <a:rPr lang="en-US" sz="1200" i="1" noProof="1" smtClean="0">
+                <a:solidFill>
+                  <a:schemeClr val="bg1"/>
+                </a:solidFill>
+                <a:latin typeface="+mj-lt"/>
+              </a:rPr>
+              <a:t>topic</a:t>
+            </a:r>
+            <a:endParaRPr lang="en-US" sz="1200" i="1" noProof="1">
+              <a:solidFill>
+                <a:schemeClr val="bg1"/>
+              </a:solidFill>
+              <a:latin typeface="+mj-lt"/>
+            </a:endParaRPr>
+          </a:p>
+        </p:txBody>
+      </p:sp>
+      <p:sp>
+        <p:nvSpPr>
+          <p:cNvPr id="39" name="Abgerundetes Rechteck 38"/>
+          <p:cNvSpPr>
+            <a:spLocks noChangeAspect="1"/>
+          </p:cNvSpPr>
+          <p:nvPr/>
+        </p:nvSpPr>
+        <p:spPr>
+          <a:xfrm>
+            <a:off x="6731900" y="2703657"/>
+            <a:ext cx="283928" cy="283928"/>
+          </a:xfrm>
+          <a:prstGeom prst="roundRect">
+            <a:avLst/>
+          </a:prstGeom>
+          <a:solidFill>
+            <a:schemeClr val="accent4">
+              <a:lumMod val="60000"/>
+              <a:lumOff val="40000"/>
+            </a:schemeClr>
+          </a:solidFill>
+          <a:ln w="3175">
+            <a:noFill/>
+            <a:prstDash val="sysDot"/>
+          </a:ln>
+          <a:effectLst/>
+        </p:spPr>
+        <p:style>
+          <a:lnRef idx="2">
+            <a:schemeClr val="accent1">
+              <a:shade val="50000"/>
+            </a:schemeClr>
+          </a:lnRef>
+          <a:fillRef idx="1">
+            <a:schemeClr val="accent1"/>
+          </a:fillRef>
+          <a:effectRef idx="0">
+            <a:schemeClr val="accent1"/>
+          </a:effectRef>
+          <a:fontRef idx="minor">
+            <a:schemeClr val="lt1"/>
+          </a:fontRef>
+        </p:style>
+        <p:txBody>
+          <a:bodyPr rtlCol="0" anchor="ctr" anchorCtr="0"/>
+          <a:lstStyle/>
+          <a:p>
+            <a:endParaRPr lang="en-US" sz="1200" i="1" noProof="1">
+              <a:solidFill>
+                <a:schemeClr val="bg1"/>
+              </a:solidFill>
+              <a:latin typeface="+mj-lt"/>
+            </a:endParaRPr>
+          </a:p>
+        </p:txBody>
+      </p:sp>
+      <p:sp>
+        <p:nvSpPr>
+          <p:cNvPr id="40" name="Abgerundetes Rechteck 39"/>
+          <p:cNvSpPr>
+            <a:spLocks noChangeAspect="1"/>
+          </p:cNvSpPr>
+          <p:nvPr/>
+        </p:nvSpPr>
+        <p:spPr>
+          <a:xfrm>
+            <a:off x="6370475" y="2703657"/>
+            <a:ext cx="283928" cy="283928"/>
+          </a:xfrm>
+          <a:prstGeom prst="roundRect">
+            <a:avLst/>
+          </a:prstGeom>
+          <a:solidFill>
+            <a:schemeClr val="accent4">
+              <a:lumMod val="60000"/>
+              <a:lumOff val="40000"/>
+            </a:schemeClr>
+          </a:solidFill>
+          <a:ln w="3175">
+            <a:noFill/>
+            <a:prstDash val="sysDot"/>
+          </a:ln>
+          <a:effectLst/>
+        </p:spPr>
+        <p:style>
+          <a:lnRef idx="2">
+            <a:schemeClr val="accent1">
+              <a:shade val="50000"/>
+            </a:schemeClr>
+          </a:lnRef>
+          <a:fillRef idx="1">
+            <a:schemeClr val="accent1"/>
+          </a:fillRef>
+          <a:effectRef idx="0">
+            <a:schemeClr val="accent1"/>
+          </a:effectRef>
+          <a:fontRef idx="minor">
+            <a:schemeClr val="lt1"/>
+          </a:fontRef>
+        </p:style>
+        <p:txBody>
+          <a:bodyPr rtlCol="0" anchor="ctr" anchorCtr="0"/>
+          <a:lstStyle/>
+          <a:p>
+            <a:endParaRPr lang="en-US" sz="1200" i="1" noProof="1">
+              <a:solidFill>
+                <a:schemeClr val="bg1"/>
+              </a:solidFill>
+              <a:latin typeface="+mj-lt"/>
+            </a:endParaRPr>
+          </a:p>
+        </p:txBody>
+      </p:sp>
+      <p:sp>
+        <p:nvSpPr>
+          <p:cNvPr id="41" name="Abgerundetes Rechteck 40"/>
+          <p:cNvSpPr>
+            <a:spLocks noChangeAspect="1"/>
+          </p:cNvSpPr>
+          <p:nvPr/>
+        </p:nvSpPr>
+        <p:spPr>
+          <a:xfrm>
+            <a:off x="5991905" y="2703657"/>
+            <a:ext cx="283928" cy="283928"/>
+          </a:xfrm>
+          <a:prstGeom prst="roundRect">
+            <a:avLst/>
+          </a:prstGeom>
+          <a:solidFill>
+            <a:schemeClr val="accent4">
+              <a:lumMod val="60000"/>
+              <a:lumOff val="40000"/>
+            </a:schemeClr>
+          </a:solidFill>
+          <a:ln w="3175">
+            <a:noFill/>
+            <a:prstDash val="sysDot"/>
+          </a:ln>
+          <a:effectLst/>
+        </p:spPr>
+        <p:style>
+          <a:lnRef idx="2">
+            <a:schemeClr val="accent1">
+              <a:shade val="50000"/>
+            </a:schemeClr>
+          </a:lnRef>
+          <a:fillRef idx="1">
+            <a:schemeClr val="accent1"/>
+          </a:fillRef>
+          <a:effectRef idx="0">
+            <a:schemeClr val="accent1"/>
+          </a:effectRef>
+          <a:fontRef idx="minor">
+            <a:schemeClr val="lt1"/>
+          </a:fontRef>
+        </p:style>
+        <p:txBody>
+          <a:bodyPr rtlCol="0" anchor="ctr" anchorCtr="0"/>
+          <a:lstStyle/>
+          <a:p>
+            <a:endParaRPr lang="en-US" sz="1200" i="1" noProof="1">
+              <a:solidFill>
+                <a:schemeClr val="bg1"/>
+              </a:solidFill>
+              <a:latin typeface="+mj-lt"/>
+            </a:endParaRPr>
+          </a:p>
+        </p:txBody>
+      </p:sp>
+      <p:sp>
+        <p:nvSpPr>
+          <p:cNvPr id="42" name="Abgerundetes Rechteck 41"/>
+          <p:cNvSpPr/>
+          <p:nvPr/>
+        </p:nvSpPr>
+        <p:spPr>
+          <a:xfrm>
+            <a:off x="5476802" y="3226528"/>
+            <a:ext cx="1692528" cy="374469"/>
+          </a:xfrm>
+          <a:prstGeom prst="roundRect">
+            <a:avLst/>
+          </a:prstGeom>
+          <a:solidFill>
+            <a:srgbClr val="8497B0"/>
+          </a:solidFill>
+          <a:ln w="3175">
+            <a:solidFill>
+              <a:schemeClr val="tx2">
+                <a:lumMod val="40000"/>
+                <a:lumOff val="60000"/>
+              </a:schemeClr>
+            </a:solidFill>
+            <a:prstDash val="sysDot"/>
+          </a:ln>
+          <a:effectLst>
+            <a:outerShdw blurRad="177800" dist="38100" dir="2700000" algn="tl" rotWithShape="0">
+              <a:prstClr val="black">
+                <a:alpha val="25000"/>
+              </a:prstClr>
+            </a:outerShdw>
+          </a:effectLst>
+        </p:spPr>
+        <p:style>
+          <a:lnRef idx="2">
+            <a:schemeClr val="accent1">
+              <a:shade val="50000"/>
+            </a:schemeClr>
+          </a:lnRef>
+          <a:fillRef idx="1">
+            <a:schemeClr val="accent1"/>
+          </a:fillRef>
+          <a:effectRef idx="0">
+            <a:schemeClr val="accent1"/>
+          </a:effectRef>
+          <a:fontRef idx="minor">
+            <a:schemeClr val="lt1"/>
+          </a:fontRef>
+        </p:style>
+        <p:txBody>
+          <a:bodyPr rtlCol="0" anchor="ctr" anchorCtr="0"/>
+          <a:lstStyle/>
+          <a:p>
+            <a:r>
+              <a:rPr lang="en-US" sz="1200" i="1" noProof="1" smtClean="0">
+                <a:solidFill>
+                  <a:schemeClr val="bg1"/>
+                </a:solidFill>
+                <a:latin typeface="+mj-lt"/>
+              </a:rPr>
+              <a:t>topic</a:t>
+            </a:r>
+            <a:endParaRPr lang="en-US" sz="1200" i="1" noProof="1">
+              <a:solidFill>
+                <a:schemeClr val="bg1"/>
+              </a:solidFill>
+              <a:latin typeface="+mj-lt"/>
+            </a:endParaRPr>
+          </a:p>
+        </p:txBody>
+      </p:sp>
+      <p:sp>
+        <p:nvSpPr>
+          <p:cNvPr id="44" name="Abgerundetes Rechteck 43"/>
+          <p:cNvSpPr>
+            <a:spLocks noChangeAspect="1"/>
+          </p:cNvSpPr>
+          <p:nvPr/>
+        </p:nvSpPr>
+        <p:spPr>
+          <a:xfrm>
+            <a:off x="6731900" y="3270803"/>
+            <a:ext cx="283928" cy="283928"/>
+          </a:xfrm>
+          <a:prstGeom prst="roundRect">
+            <a:avLst/>
+          </a:prstGeom>
+          <a:solidFill>
+            <a:schemeClr val="accent4">
+              <a:lumMod val="60000"/>
+              <a:lumOff val="40000"/>
+            </a:schemeClr>
+          </a:solidFill>
+          <a:ln w="3175">
+            <a:noFill/>
+            <a:prstDash val="sysDot"/>
+          </a:ln>
+          <a:effectLst/>
+        </p:spPr>
+        <p:style>
+          <a:lnRef idx="2">
+            <a:schemeClr val="accent1">
+              <a:shade val="50000"/>
+            </a:schemeClr>
+          </a:lnRef>
+          <a:fillRef idx="1">
+            <a:schemeClr val="accent1"/>
+          </a:fillRef>
+          <a:effectRef idx="0">
+            <a:schemeClr val="accent1"/>
+          </a:effectRef>
+          <a:fontRef idx="minor">
+            <a:schemeClr val="lt1"/>
+          </a:fontRef>
+        </p:style>
+        <p:txBody>
+          <a:bodyPr rtlCol="0" anchor="ctr" anchorCtr="0"/>
+          <a:lstStyle/>
+          <a:p>
+            <a:endParaRPr lang="en-US" sz="1200" i="1" noProof="1">
+              <a:solidFill>
+                <a:schemeClr val="bg1"/>
+              </a:solidFill>
+              <a:latin typeface="+mj-lt"/>
+            </a:endParaRPr>
+          </a:p>
+        </p:txBody>
+      </p:sp>
+      <p:sp>
+        <p:nvSpPr>
+          <p:cNvPr id="46" name="Abgerundetes Rechteck 45"/>
+          <p:cNvSpPr>
+            <a:spLocks noChangeAspect="1"/>
+          </p:cNvSpPr>
+          <p:nvPr/>
+        </p:nvSpPr>
+        <p:spPr>
+          <a:xfrm>
+            <a:off x="6370475" y="3270803"/>
+            <a:ext cx="283928" cy="283928"/>
+          </a:xfrm>
+          <a:prstGeom prst="roundRect">
+            <a:avLst/>
+          </a:prstGeom>
+          <a:solidFill>
+            <a:schemeClr val="accent4">
+              <a:lumMod val="60000"/>
+              <a:lumOff val="40000"/>
+            </a:schemeClr>
+          </a:solidFill>
+          <a:ln w="3175">
+            <a:noFill/>
+            <a:prstDash val="sysDot"/>
+          </a:ln>
+          <a:effectLst/>
+        </p:spPr>
+        <p:style>
+          <a:lnRef idx="2">
+            <a:schemeClr val="accent1">
+              <a:shade val="50000"/>
+            </a:schemeClr>
+          </a:lnRef>
+          <a:fillRef idx="1">
+            <a:schemeClr val="accent1"/>
+          </a:fillRef>
+          <a:effectRef idx="0">
+            <a:schemeClr val="accent1"/>
+          </a:effectRef>
+          <a:fontRef idx="minor">
+            <a:schemeClr val="lt1"/>
+          </a:fontRef>
+        </p:style>
+        <p:txBody>
+          <a:bodyPr rtlCol="0" anchor="ctr" anchorCtr="0"/>
+          <a:lstStyle/>
+          <a:p>
+            <a:endParaRPr lang="en-US" sz="1200" i="1" noProof="1">
+              <a:solidFill>
+                <a:schemeClr val="bg1"/>
+              </a:solidFill>
+              <a:latin typeface="+mj-lt"/>
+            </a:endParaRPr>
+          </a:p>
+        </p:txBody>
+      </p:sp>
+      <p:sp>
+        <p:nvSpPr>
+          <p:cNvPr id="47" name="Abgerundetes Rechteck 46"/>
+          <p:cNvSpPr>
+            <a:spLocks noChangeAspect="1"/>
+          </p:cNvSpPr>
+          <p:nvPr/>
+        </p:nvSpPr>
+        <p:spPr>
+          <a:xfrm>
+            <a:off x="5991905" y="3270803"/>
+            <a:ext cx="283928" cy="283928"/>
+          </a:xfrm>
+          <a:prstGeom prst="roundRect">
+            <a:avLst/>
+          </a:prstGeom>
+          <a:solidFill>
+            <a:schemeClr val="accent4">
+              <a:lumMod val="60000"/>
+              <a:lumOff val="40000"/>
+            </a:schemeClr>
+          </a:solidFill>
+          <a:ln w="3175">
+            <a:noFill/>
+            <a:prstDash val="sysDot"/>
+          </a:ln>
+          <a:effectLst/>
+        </p:spPr>
+        <p:style>
+          <a:lnRef idx="2">
+            <a:schemeClr val="accent1">
+              <a:shade val="50000"/>
+            </a:schemeClr>
+          </a:lnRef>
+          <a:fillRef idx="1">
+            <a:schemeClr val="accent1"/>
+          </a:fillRef>
+          <a:effectRef idx="0">
+            <a:schemeClr val="accent1"/>
+          </a:effectRef>
+          <a:fontRef idx="minor">
+            <a:schemeClr val="lt1"/>
+          </a:fontRef>
+        </p:style>
+        <p:txBody>
+          <a:bodyPr rtlCol="0" anchor="ctr" anchorCtr="0"/>
+          <a:lstStyle/>
+          <a:p>
+            <a:endParaRPr lang="en-US" sz="1200" i="1" noProof="1">
+              <a:solidFill>
+                <a:schemeClr val="bg1"/>
+              </a:solidFill>
+              <a:latin typeface="+mj-lt"/>
+            </a:endParaRPr>
+          </a:p>
+        </p:txBody>
+      </p:sp>
+      <p:sp>
+        <p:nvSpPr>
+          <p:cNvPr id="49" name="Abgerundetes Rechteck 48"/>
+          <p:cNvSpPr>
+            <a:spLocks noChangeAspect="1"/>
+          </p:cNvSpPr>
+          <p:nvPr/>
+        </p:nvSpPr>
+        <p:spPr>
+          <a:xfrm>
+            <a:off x="3628396" y="2705643"/>
+            <a:ext cx="283928" cy="283928"/>
+          </a:xfrm>
+          <a:prstGeom prst="roundRect">
+            <a:avLst/>
+          </a:prstGeom>
+          <a:solidFill>
+            <a:schemeClr val="accent4">
+              <a:lumMod val="60000"/>
+              <a:lumOff val="40000"/>
+            </a:schemeClr>
+          </a:solidFill>
+          <a:ln w="3175">
+            <a:noFill/>
+            <a:prstDash val="sysDot"/>
+          </a:ln>
+          <a:effectLst/>
+        </p:spPr>
+        <p:style>
+          <a:lnRef idx="2">
+            <a:schemeClr val="accent1">
+              <a:shade val="50000"/>
+            </a:schemeClr>
+          </a:lnRef>
+          <a:fillRef idx="1">
+            <a:schemeClr val="accent1"/>
+          </a:fillRef>
+          <a:effectRef idx="0">
+            <a:schemeClr val="accent1"/>
+          </a:effectRef>
+          <a:fontRef idx="minor">
+            <a:schemeClr val="lt1"/>
+          </a:fontRef>
+        </p:style>
+        <p:txBody>
+          <a:bodyPr rtlCol="0" anchor="ctr" anchorCtr="0"/>
+          <a:lstStyle/>
+          <a:p>
+            <a:endParaRPr lang="en-US" sz="1200" i="1" noProof="1">
+              <a:solidFill>
+                <a:schemeClr val="bg1"/>
+              </a:solidFill>
+              <a:latin typeface="+mj-lt"/>
+            </a:endParaRPr>
+          </a:p>
+        </p:txBody>
+      </p:sp>
+      <p:sp>
+        <p:nvSpPr>
+          <p:cNvPr id="50" name="Abgerundetes Rechteck 49"/>
+          <p:cNvSpPr>
+            <a:spLocks noChangeAspect="1"/>
+          </p:cNvSpPr>
+          <p:nvPr/>
+        </p:nvSpPr>
+        <p:spPr>
+          <a:xfrm>
+            <a:off x="8536126" y="2713361"/>
+            <a:ext cx="283928" cy="283928"/>
+          </a:xfrm>
+          <a:prstGeom prst="roundRect">
+            <a:avLst/>
+          </a:prstGeom>
+          <a:solidFill>
+            <a:schemeClr val="accent4">
+              <a:lumMod val="60000"/>
+              <a:lumOff val="40000"/>
+            </a:schemeClr>
+          </a:solidFill>
+          <a:ln w="3175">
+            <a:noFill/>
+            <a:prstDash val="sysDot"/>
+          </a:ln>
+          <a:effectLst/>
+        </p:spPr>
+        <p:style>
+          <a:lnRef idx="2">
+            <a:schemeClr val="accent1">
+              <a:shade val="50000"/>
+            </a:schemeClr>
+          </a:lnRef>
+          <a:fillRef idx="1">
+            <a:schemeClr val="accent1"/>
+          </a:fillRef>
+          <a:effectRef idx="0">
+            <a:schemeClr val="accent1"/>
+          </a:effectRef>
+          <a:fontRef idx="minor">
+            <a:schemeClr val="lt1"/>
+          </a:fontRef>
+        </p:style>
+        <p:txBody>
+          <a:bodyPr rtlCol="0" anchor="ctr" anchorCtr="0"/>
+          <a:lstStyle/>
+          <a:p>
+            <a:endParaRPr lang="en-US" sz="1200" i="1" noProof="1">
+              <a:solidFill>
+                <a:schemeClr val="bg1"/>
               </a:solidFill>
               <a:latin typeface="+mj-lt"/>
             </a:endParaRPr>

</xml_diff>